<commit_message>
Added Goals to last slide
</commit_message>
<xml_diff>
--- a/Architecture/arm_introduction/ARM/Thumb_intro.pptx
+++ b/Architecture/arm_introduction/ARM/Thumb_intro.pptx
@@ -6236,10 +6236,53 @@
             <p:ph idx="1"/>
           </p:nvPr>
         </p:nvSpPr>
-        <p:spPr/>
-        <p:txBody>
-          <a:bodyPr/>
-          <a:lstStyle/>
+        <p:spPr>
+          <a:xfrm>
+            <a:off x="914401" y="1423781"/>
+            <a:ext cx="10532828" cy="4326044"/>
+          </a:xfrm>
+        </p:spPr>
+        <p:txBody>
+          <a:bodyPr>
+            <a:normAutofit lnSpcReduction="10000"/>
+          </a:bodyPr>
+          <a:lstStyle/>
+          <a:p>
+            <a:r>
+              <a:rPr lang="en-US" dirty="0"/>
+              <a:t>Goals:</a:t>
+            </a:r>
+          </a:p>
+          <a:p>
+            <a:pPr lvl="1"/>
+            <a:r>
+              <a:rPr lang="en-US" dirty="0"/>
+              <a:t>Study how a single chip can offer features that trade-off code-size and performance</a:t>
+            </a:r>
+          </a:p>
+          <a:p>
+            <a:pPr lvl="1"/>
+            <a:r>
+              <a:rPr lang="en-US" dirty="0"/>
+              <a:t>Gain experience using command line tools</a:t>
+            </a:r>
+          </a:p>
+          <a:p>
+            <a:pPr lvl="1"/>
+            <a:r>
+              <a:rPr lang="en-US" dirty="0"/>
+              <a:t>“The ARM ISA inherently possesses heterogeneity in its design”</a:t>
+            </a:r>
+            <a:r>
+              <a:rPr lang="en-US" baseline="30000" dirty="0"/>
+              <a:t>1 </a:t>
+            </a:r>
+            <a:r>
+              <a:rPr lang="en-US" dirty="0"/>
+              <a:t>and we want to explore that.</a:t>
+            </a:r>
+            <a:endParaRPr lang="en-US" baseline="30000" dirty="0"/>
+          </a:p>
           <a:p>
             <a:r>
               <a:rPr lang="en-US" dirty="0"/>
@@ -6291,11 +6334,7 @@
             <a:pPr lvl="1"/>
             <a:r>
               <a:rPr lang="en-US" dirty="0"/>
-              <a:t>Summarize your results and answer </a:t>
-            </a:r>
-            <a:r>
-              <a:rPr lang="en-US"/>
-              <a:t>some questions.</a:t>
+              <a:t>Summarize your results and answer some questions.</a:t>
             </a:r>
           </a:p>
         </p:txBody>
@@ -6354,6 +6393,81 @@
               <a:t>9</a:t>
             </a:fld>
             <a:endParaRPr lang="en-US"/>
+          </a:p>
+        </p:txBody>
+      </p:sp>
+      <p:sp>
+        <p:nvSpPr>
+          <p:cNvPr id="6" name="TextBox 5">
+            <a:extLst>
+              <a:ext uri="{FF2B5EF4-FFF2-40B4-BE49-F238E27FC236}">
+                <a16:creationId xmlns:a16="http://schemas.microsoft.com/office/drawing/2014/main" id="{80C05BEF-F38B-0942-85B1-349EAFB633CB}"/>
+              </a:ext>
+            </a:extLst>
+          </p:cNvPr>
+          <p:cNvSpPr txBox="1"/>
+          <p:nvPr/>
+        </p:nvSpPr>
+        <p:spPr>
+          <a:xfrm>
+            <a:off x="185530" y="5844207"/>
+            <a:ext cx="11900452" cy="584775"/>
+          </a:xfrm>
+          <a:prstGeom prst="rect">
+            <a:avLst/>
+          </a:prstGeom>
+          <a:noFill/>
+        </p:spPr>
+        <p:txBody>
+          <a:bodyPr wrap="square" rtlCol="0">
+            <a:spAutoFit/>
+          </a:bodyPr>
+          <a:lstStyle/>
+          <a:p>
+            <a:r>
+              <a:rPr lang="en-US" sz="1600" dirty="0"/>
+              <a:t>1. </a:t>
+            </a:r>
+            <a:r>
+              <a:rPr lang="en-US" sz="1600" dirty="0" err="1"/>
+              <a:t>Wooseok</a:t>
+            </a:r>
+            <a:r>
+              <a:rPr lang="en-US" sz="1600" dirty="0"/>
+              <a:t> Lee, Dam </a:t>
+            </a:r>
+            <a:r>
+              <a:rPr lang="en-US" sz="1600" dirty="0" err="1"/>
+              <a:t>Sunwoo</a:t>
+            </a:r>
+            <a:r>
+              <a:rPr lang="en-US" sz="1600" dirty="0"/>
+              <a:t>, Christopher D. Emmons, Andreas </a:t>
+            </a:r>
+            <a:r>
+              <a:rPr lang="en-US" sz="1600" dirty="0" err="1"/>
+              <a:t>Gerstlauer</a:t>
+            </a:r>
+            <a:r>
+              <a:rPr lang="en-US" sz="1600" dirty="0"/>
+              <a:t>, and </a:t>
+            </a:r>
+            <a:r>
+              <a:rPr lang="en-US" sz="1600" dirty="0" err="1"/>
+              <a:t>Lizy</a:t>
+            </a:r>
+            <a:r>
+              <a:rPr lang="en-US" sz="1600" dirty="0"/>
+              <a:t> John </a:t>
+            </a:r>
+            <a:r>
+              <a:rPr lang="en-US" sz="1600" i="1" dirty="0"/>
+              <a:t>Exploring Opportunities for Heterogeneous-ISA Core Architectures in High-Performance Mobile SoCs, </a:t>
+            </a:r>
+            <a:r>
+              <a:rPr lang="en-US" sz="1600" dirty="0"/>
+              <a:t>University of Texas, Technical report, UT-CERC-17-01 March 10, 2017</a:t>
+            </a:r>
           </a:p>
         </p:txBody>
       </p:sp>

</xml_diff>

<commit_message>
Giving both long and short version of MIPS assembly instruction handout.  Also adding LaTeX source for it
</commit_message>
<xml_diff>
--- a/Architecture/arm_introduction/ARM/Thumb_intro.pptx
+++ b/Architecture/arm_introduction/ARM/Thumb_intro.pptx
@@ -205,7 +205,7 @@
           <a:p>
             <a:fld id="{260930CF-E1B1-E844-9903-DBA6F9AF788E}" type="datetimeFigureOut">
               <a:rPr lang="en-US" smtClean="0"/>
-              <a:t>8/13/20</a:t>
+              <a:t>7/14/22</a:t>
             </a:fld>
             <a:endParaRPr lang="en-US"/>
           </a:p>
@@ -5440,8 +5440,13 @@
           <a:p>
             <a:r>
               <a:rPr lang="en-US" dirty="0"/>
-              <a:t>A 2002 paper by Krishnaswamy and Gupta found Thumb-1 code to be roughly 70% the size of ARM code on average and up to 30% slower. (citation)</a:t>
-            </a:r>
+              <a:t>A 2002 paper by Krishnaswamy and Gupta found Thumb-1 code to be roughly 70% the size of ARM code on average and up to 30</a:t>
+            </a:r>
+            <a:r>
+              <a:rPr lang="en-US"/>
+              <a:t>% slower</a:t>
+            </a:r>
+            <a:endParaRPr lang="en-US" dirty="0"/>
           </a:p>
         </p:txBody>
       </p:sp>

</xml_diff>